<commit_message>
updating the README file
</commit_message>
<xml_diff>
--- a/ppt/Terminal-App-Presentation.pptx
+++ b/ppt/Terminal-App-Presentation.pptx
@@ -8,11 +8,13 @@
     <p:sldId id="256" r:id="rId2"/>
     <p:sldId id="257" r:id="rId3"/>
     <p:sldId id="258" r:id="rId4"/>
-    <p:sldId id="259" r:id="rId5"/>
-    <p:sldId id="260" r:id="rId6"/>
-    <p:sldId id="261" r:id="rId7"/>
-    <p:sldId id="262" r:id="rId8"/>
-    <p:sldId id="263" r:id="rId9"/>
+    <p:sldId id="264" r:id="rId5"/>
+    <p:sldId id="259" r:id="rId6"/>
+    <p:sldId id="260" r:id="rId7"/>
+    <p:sldId id="261" r:id="rId8"/>
+    <p:sldId id="265" r:id="rId9"/>
+    <p:sldId id="262" r:id="rId10"/>
+    <p:sldId id="263" r:id="rId11"/>
   </p:sldIdLst>
   <p:sldSz cx="12192000" cy="6858000"/>
   <p:notesSz cx="6858000" cy="9144000"/>
@@ -4619,6 +4621,229 @@
 </p:sld>
 </file>
 
+<file path=ppt/slides/slide10.xml><?xml version="1.0" encoding="utf-8"?>
+<p:sld xmlns:a="http://schemas.openxmlformats.org/drawingml/2006/main" xmlns:r="http://schemas.openxmlformats.org/officeDocument/2006/relationships" xmlns:p="http://schemas.openxmlformats.org/presentationml/2006/main">
+  <p:cSld>
+    <p:spTree>
+      <p:nvGrpSpPr>
+        <p:cNvPr id="1" name=""/>
+        <p:cNvGrpSpPr/>
+        <p:nvPr/>
+      </p:nvGrpSpPr>
+      <p:grpSpPr>
+        <a:xfrm>
+          <a:off x="0" y="0"/>
+          <a:ext cx="0" cy="0"/>
+          <a:chOff x="0" y="0"/>
+          <a:chExt cx="0" cy="0"/>
+        </a:xfrm>
+      </p:grpSpPr>
+      <p:sp>
+        <p:nvSpPr>
+          <p:cNvPr id="2" name="TextBox 1">
+            <a:extLst>
+              <a:ext uri="{FF2B5EF4-FFF2-40B4-BE49-F238E27FC236}">
+                <a16:creationId xmlns:a16="http://schemas.microsoft.com/office/drawing/2014/main" id="{06A561E6-1AC7-41FA-AEBF-88A6FF5019BF}"/>
+              </a:ext>
+            </a:extLst>
+          </p:cNvPr>
+          <p:cNvSpPr txBox="1"/>
+          <p:nvPr/>
+        </p:nvSpPr>
+        <p:spPr>
+          <a:xfrm>
+            <a:off x="1380113" y="1100259"/>
+            <a:ext cx="4356867" cy="3393237"/>
+          </a:xfrm>
+          <a:prstGeom prst="rect">
+            <a:avLst/>
+          </a:prstGeom>
+          <a:noFill/>
+        </p:spPr>
+        <p:txBody>
+          <a:bodyPr wrap="square">
+            <a:spAutoFit/>
+          </a:bodyPr>
+          <a:lstStyle/>
+          <a:p>
+            <a:pPr algn="l"/>
+            <a:r>
+              <a:rPr lang="en-AU" sz="3200" dirty="0">
+                <a:solidFill>
+                  <a:schemeClr val="tx1">
+                    <a:lumMod val="75000"/>
+                  </a:schemeClr>
+                </a:solidFill>
+              </a:rPr>
+              <a:t>Favourite Parts:</a:t>
+            </a:r>
+          </a:p>
+          <a:p>
+            <a:pPr algn="l"/>
+            <a:endParaRPr lang="en-AU" sz="1050" dirty="0">
+              <a:solidFill>
+                <a:schemeClr val="tx1">
+                  <a:lumMod val="75000"/>
+                </a:schemeClr>
+              </a:solidFill>
+            </a:endParaRPr>
+          </a:p>
+          <a:p>
+            <a:pPr marL="342900" indent="-342900" algn="l">
+              <a:buFont typeface="Arial" panose="020B0604020202020204" pitchFamily="34" charset="0"/>
+              <a:buChar char="•"/>
+            </a:pPr>
+            <a:r>
+              <a:rPr lang="en-AU" sz="2000" dirty="0"/>
+              <a:t>Creating the logic and coding the app.</a:t>
+            </a:r>
+          </a:p>
+          <a:p>
+            <a:pPr marL="342900" indent="-342900" algn="l">
+              <a:buFont typeface="Arial" panose="020B0604020202020204" pitchFamily="34" charset="0"/>
+              <a:buChar char="•"/>
+            </a:pPr>
+            <a:endParaRPr lang="en-AU" sz="2000" dirty="0"/>
+          </a:p>
+          <a:p>
+            <a:pPr marL="342900" indent="-342900" algn="l">
+              <a:buFont typeface="Arial" panose="020B0604020202020204" pitchFamily="34" charset="0"/>
+              <a:buChar char="•"/>
+            </a:pPr>
+            <a:r>
+              <a:rPr lang="en-AU" sz="2000" dirty="0"/>
+              <a:t>Using gems to make terminal app more user friendly.</a:t>
+            </a:r>
+          </a:p>
+          <a:p>
+            <a:endParaRPr lang="en-AU" sz="3200" dirty="0">
+              <a:solidFill>
+                <a:schemeClr val="tx1">
+                  <a:lumMod val="75000"/>
+                </a:schemeClr>
+              </a:solidFill>
+            </a:endParaRPr>
+          </a:p>
+          <a:p>
+            <a:pPr marL="342900" indent="-342900" algn="l">
+              <a:buFont typeface="Arial" panose="020B0604020202020204" pitchFamily="34" charset="0"/>
+              <a:buChar char="•"/>
+            </a:pPr>
+            <a:endParaRPr lang="en-AU" sz="2000" dirty="0"/>
+          </a:p>
+          <a:p>
+            <a:pPr marL="342900" indent="-342900" algn="l">
+              <a:buFont typeface="Arial" panose="020B0604020202020204" pitchFamily="34" charset="0"/>
+              <a:buChar char="•"/>
+            </a:pPr>
+            <a:endParaRPr lang="en-AU" sz="2000" dirty="0"/>
+          </a:p>
+        </p:txBody>
+      </p:sp>
+      <p:sp>
+        <p:nvSpPr>
+          <p:cNvPr id="3" name="TextBox 2">
+            <a:extLst>
+              <a:ext uri="{FF2B5EF4-FFF2-40B4-BE49-F238E27FC236}">
+                <a16:creationId xmlns:a16="http://schemas.microsoft.com/office/drawing/2014/main" id="{D39C52F7-C89B-4135-93CB-23081ADCC705}"/>
+              </a:ext>
+            </a:extLst>
+          </p:cNvPr>
+          <p:cNvSpPr txBox="1"/>
+          <p:nvPr/>
+        </p:nvSpPr>
+        <p:spPr>
+          <a:xfrm>
+            <a:off x="6712927" y="1169377"/>
+            <a:ext cx="3776296" cy="3385542"/>
+          </a:xfrm>
+          <a:prstGeom prst="rect">
+            <a:avLst/>
+          </a:prstGeom>
+          <a:noFill/>
+        </p:spPr>
+        <p:txBody>
+          <a:bodyPr wrap="square" rtlCol="0">
+            <a:spAutoFit/>
+          </a:bodyPr>
+          <a:lstStyle/>
+          <a:p>
+            <a:r>
+              <a:rPr lang="en-AU" sz="2800" dirty="0">
+                <a:solidFill>
+                  <a:schemeClr val="tx1">
+                    <a:lumMod val="75000"/>
+                  </a:schemeClr>
+                </a:solidFill>
+              </a:rPr>
+              <a:t>Challenges:</a:t>
+            </a:r>
+          </a:p>
+          <a:p>
+            <a:endParaRPr lang="en-AU" sz="1000" dirty="0">
+              <a:solidFill>
+                <a:schemeClr val="tx1">
+                  <a:lumMod val="75000"/>
+                </a:schemeClr>
+              </a:solidFill>
+            </a:endParaRPr>
+          </a:p>
+          <a:p>
+            <a:pPr marL="342900" indent="-342900">
+              <a:buFont typeface="Arial" panose="020B0604020202020204" pitchFamily="34" charset="0"/>
+              <a:buChar char="•"/>
+            </a:pPr>
+            <a:r>
+              <a:rPr lang="en-AU" sz="2000" dirty="0"/>
+              <a:t>Trying to find a better more complicated idea and adding more features within the time frame.</a:t>
+            </a:r>
+          </a:p>
+          <a:p>
+            <a:pPr marL="342900" indent="-342900">
+              <a:buFont typeface="Arial" panose="020B0604020202020204" pitchFamily="34" charset="0"/>
+              <a:buChar char="•"/>
+            </a:pPr>
+            <a:endParaRPr lang="en-AU" sz="2000" dirty="0"/>
+          </a:p>
+          <a:p>
+            <a:pPr marL="342900" indent="-342900">
+              <a:buFont typeface="Arial" panose="020B0604020202020204" pitchFamily="34" charset="0"/>
+              <a:buChar char="•"/>
+            </a:pPr>
+            <a:r>
+              <a:rPr lang="en-AU" sz="2000" dirty="0"/>
+              <a:t>Working on the documentations</a:t>
+            </a:r>
+            <a:r>
+              <a:rPr lang="en-AU" sz="1800" dirty="0"/>
+              <a:t>.</a:t>
+            </a:r>
+          </a:p>
+          <a:p>
+            <a:pPr marL="342900" indent="-342900">
+              <a:buFont typeface="Arial" panose="020B0604020202020204" pitchFamily="34" charset="0"/>
+              <a:buChar char="•"/>
+            </a:pPr>
+            <a:endParaRPr lang="en-AU" sz="1800" dirty="0"/>
+          </a:p>
+          <a:p>
+            <a:endParaRPr lang="en-AU" dirty="0"/>
+          </a:p>
+        </p:txBody>
+      </p:sp>
+    </p:spTree>
+    <p:extLst>
+      <p:ext uri="{BB962C8B-B14F-4D97-AF65-F5344CB8AC3E}">
+        <p14:creationId xmlns:p14="http://schemas.microsoft.com/office/powerpoint/2010/main" val="1253942707"/>
+      </p:ext>
+    </p:extLst>
+  </p:cSld>
+  <p:clrMapOvr>
+    <a:masterClrMapping/>
+  </p:clrMapOvr>
+</p:sld>
+</file>
+
 <file path=ppt/slides/slide2.xml><?xml version="1.0" encoding="utf-8"?>
 <p:sld xmlns:a="http://schemas.openxmlformats.org/drawingml/2006/main" xmlns:r="http://schemas.openxmlformats.org/officeDocument/2006/relationships" xmlns:p="http://schemas.openxmlformats.org/presentationml/2006/main">
   <p:cSld>
@@ -4722,6 +4947,16 @@
           </a:p>
           <a:p>
             <a:pPr algn="l"/>
+            <a:endParaRPr lang="en-AU" sz="4000" dirty="0">
+              <a:solidFill>
+                <a:schemeClr val="tx1">
+                  <a:lumMod val="75000"/>
+                </a:schemeClr>
+              </a:solidFill>
+            </a:endParaRPr>
+          </a:p>
+          <a:p>
+            <a:pPr algn="l"/>
             <a:r>
               <a:rPr lang="en-AU" sz="4000" dirty="0">
                 <a:solidFill>
@@ -4744,103 +4979,48 @@
             </a:endParaRPr>
           </a:p>
           <a:p>
-            <a:pPr algn="l"/>
-            <a:r>
-              <a:rPr lang="en-AU" sz="2400" dirty="0"/>
-              <a:t>1- </a:t>
-            </a:r>
-            <a:r>
-              <a:rPr lang="en-AU" sz="2000" dirty="0">
-                <a:solidFill>
-                  <a:schemeClr val="tx1">
-                    <a:lumMod val="65000"/>
-                  </a:schemeClr>
-                </a:solidFill>
-              </a:rPr>
-              <a:t>Welcoming message: </a:t>
-            </a:r>
+            <a:pPr marL="342900" indent="-342900" algn="l">
+              <a:buFont typeface="Wingdings" panose="05000000000000000000" pitchFamily="2" charset="2"/>
+              <a:buChar char="§"/>
+            </a:pPr>
             <a:r>
               <a:rPr lang="en-AU" sz="2000" dirty="0"/>
-              <a:t>Users can run the app with an option of passing their names in command line arguments , A welcoming message will then appear.</a:t>
-            </a:r>
-          </a:p>
-          <a:p>
-            <a:pPr algn="l"/>
+              <a:t>Enrolling in a course</a:t>
+            </a:r>
+          </a:p>
+          <a:p>
+            <a:pPr marL="342900" indent="-342900" algn="l">
+              <a:buFont typeface="Wingdings" panose="05000000000000000000" pitchFamily="2" charset="2"/>
+              <a:buChar char="§"/>
+            </a:pPr>
             <a:endParaRPr lang="en-AU" sz="1050" dirty="0"/>
           </a:p>
           <a:p>
-            <a:pPr algn="l"/>
+            <a:pPr marL="342900" indent="-342900" algn="l">
+              <a:buFont typeface="Wingdings" panose="05000000000000000000" pitchFamily="2" charset="2"/>
+              <a:buChar char="§"/>
+            </a:pPr>
             <a:r>
               <a:rPr lang="en-AU" sz="2000" dirty="0"/>
-              <a:t>2- </a:t>
-            </a:r>
-            <a:r>
-              <a:rPr lang="en-AU" sz="2000" dirty="0">
-                <a:solidFill>
-                  <a:schemeClr val="tx1">
-                    <a:lumMod val="65000"/>
-                  </a:schemeClr>
-                </a:solidFill>
-              </a:rPr>
-              <a:t>Enrolling in a course: </a:t>
-            </a:r>
+              <a:t>Showing course’s details</a:t>
+            </a:r>
+          </a:p>
+          <a:p>
+            <a:pPr marL="342900" indent="-342900" algn="l">
+              <a:buFont typeface="Wingdings" panose="05000000000000000000" pitchFamily="2" charset="2"/>
+              <a:buChar char="§"/>
+            </a:pPr>
+            <a:endParaRPr lang="en-AU" sz="1050" dirty="0"/>
+          </a:p>
+          <a:p>
+            <a:pPr marL="342900" indent="-342900" algn="l">
+              <a:buFont typeface="Wingdings" panose="05000000000000000000" pitchFamily="2" charset="2"/>
+              <a:buChar char="§"/>
+            </a:pPr>
             <a:r>
               <a:rPr lang="en-AU" sz="2000" dirty="0"/>
-              <a:t>Users can choose a course from the list of courses , and then choose to enrol the course.</a:t>
-            </a:r>
-          </a:p>
-          <a:p>
-            <a:pPr algn="l"/>
-            <a:endParaRPr lang="en-AU" sz="1050" dirty="0"/>
-          </a:p>
-          <a:p>
-            <a:pPr algn="l"/>
-            <a:r>
-              <a:rPr lang="en-AU" sz="2000" dirty="0"/>
-              <a:t>3- </a:t>
-            </a:r>
-            <a:r>
-              <a:rPr lang="en-AU" sz="2000" dirty="0">
-                <a:solidFill>
-                  <a:schemeClr val="tx1">
-                    <a:lumMod val="65000"/>
-                  </a:schemeClr>
-                </a:solidFill>
-              </a:rPr>
-              <a:t>Showing course’s details: </a:t>
-            </a:r>
-            <a:r>
-              <a:rPr lang="en-AU" sz="2000" dirty="0"/>
-              <a:t>Users can choose a course  to display details about .</a:t>
-            </a:r>
-          </a:p>
-          <a:p>
-            <a:pPr algn="l"/>
-            <a:endParaRPr lang="en-AU" sz="1050" dirty="0"/>
-          </a:p>
-          <a:p>
-            <a:pPr algn="l"/>
-            <a:r>
-              <a:rPr lang="en-AU" sz="2000" dirty="0"/>
-              <a:t>4- </a:t>
-            </a:r>
-            <a:r>
-              <a:rPr lang="en-AU" sz="2000" dirty="0">
-                <a:solidFill>
-                  <a:schemeClr val="tx1">
-                    <a:lumMod val="65000"/>
-                  </a:schemeClr>
-                </a:solidFill>
-              </a:rPr>
-              <a:t>Unenrolling from a course: </a:t>
-            </a:r>
-            <a:r>
-              <a:rPr lang="en-AU" sz="2000" dirty="0"/>
-              <a:t>Users can choose to unenroll from a course by showing enrolments list and the choose to unenroll ,a confirmation message will then appear with  yes or no options.</a:t>
-            </a:r>
-          </a:p>
-          <a:p>
-            <a:pPr algn="l"/>
+              <a:t>Unenrolling from a course</a:t>
+            </a:r>
             <a:endParaRPr lang="en-AU" sz="1050" dirty="0"/>
           </a:p>
           <a:p>
@@ -4981,6 +5161,868 @@
 </file>
 
 <file path=ppt/slides/slide4.xml><?xml version="1.0" encoding="utf-8"?>
+<p:sld xmlns:a="http://schemas.openxmlformats.org/drawingml/2006/main" xmlns:r="http://schemas.openxmlformats.org/officeDocument/2006/relationships" xmlns:p="http://schemas.openxmlformats.org/presentationml/2006/main">
+  <p:cSld>
+    <p:spTree>
+      <p:nvGrpSpPr>
+        <p:cNvPr id="1" name=""/>
+        <p:cNvGrpSpPr/>
+        <p:nvPr/>
+      </p:nvGrpSpPr>
+      <p:grpSpPr>
+        <a:xfrm>
+          <a:off x="0" y="0"/>
+          <a:ext cx="0" cy="0"/>
+          <a:chOff x="0" y="0"/>
+          <a:chExt cx="0" cy="0"/>
+        </a:xfrm>
+      </p:grpSpPr>
+      <p:sp>
+        <p:nvSpPr>
+          <p:cNvPr id="2" name="Title 1">
+            <a:extLst>
+              <a:ext uri="{FF2B5EF4-FFF2-40B4-BE49-F238E27FC236}">
+                <a16:creationId xmlns:a16="http://schemas.microsoft.com/office/drawing/2014/main" id="{DB27B27A-1D78-4BF5-8995-71D06B4DCF18}"/>
+              </a:ext>
+            </a:extLst>
+          </p:cNvPr>
+          <p:cNvSpPr txBox="1">
+            <a:spLocks/>
+          </p:cNvSpPr>
+          <p:nvPr/>
+        </p:nvSpPr>
+        <p:spPr>
+          <a:xfrm>
+            <a:off x="1014411" y="600230"/>
+            <a:ext cx="9825039" cy="6124420"/>
+          </a:xfrm>
+          <a:prstGeom prst="rect">
+            <a:avLst/>
+          </a:prstGeom>
+        </p:spPr>
+        <p:txBody>
+          <a:bodyPr>
+            <a:noAutofit/>
+          </a:bodyPr>
+          <a:lstStyle>
+            <a:lvl1pPr algn="r" defTabSz="914400" rtl="0" eaLnBrk="1" latinLnBrk="0" hangingPunct="1">
+              <a:lnSpc>
+                <a:spcPct val="90000"/>
+              </a:lnSpc>
+              <a:spcBef>
+                <a:spcPct val="0"/>
+              </a:spcBef>
+              <a:buNone/>
+              <a:defRPr sz="3400" b="0" i="0" kern="1200" cap="none">
+                <a:solidFill>
+                  <a:schemeClr val="tx1"/>
+                </a:solidFill>
+                <a:effectLst/>
+                <a:latin typeface="+mj-lt"/>
+                <a:ea typeface="+mj-ea"/>
+                <a:cs typeface="+mj-cs"/>
+              </a:defRPr>
+            </a:lvl1pPr>
+          </a:lstStyle>
+          <a:p>
+            <a:pPr algn="l"/>
+            <a:r>
+              <a:rPr lang="en-AU" sz="3200" dirty="0">
+                <a:solidFill>
+                  <a:schemeClr val="tx1">
+                    <a:lumMod val="75000"/>
+                  </a:schemeClr>
+                </a:solidFill>
+              </a:rPr>
+              <a:t>    Classes used:</a:t>
+            </a:r>
+          </a:p>
+          <a:p>
+            <a:pPr algn="l"/>
+            <a:endParaRPr lang="en-AU" sz="1050" dirty="0">
+              <a:solidFill>
+                <a:schemeClr val="tx1">
+                  <a:lumMod val="75000"/>
+                </a:schemeClr>
+              </a:solidFill>
+            </a:endParaRPr>
+          </a:p>
+          <a:p>
+            <a:pPr marL="342900" indent="-342900" algn="l">
+              <a:buFont typeface="Arial" panose="020B0604020202020204" pitchFamily="34" charset="0"/>
+              <a:buChar char="•"/>
+            </a:pPr>
+            <a:endParaRPr lang="en-AU" sz="2400" dirty="0"/>
+          </a:p>
+          <a:p>
+            <a:pPr algn="l"/>
+            <a:r>
+              <a:rPr lang="en-AU" sz="2400" dirty="0"/>
+              <a:t> </a:t>
+            </a:r>
+          </a:p>
+          <a:p>
+            <a:pPr algn="l"/>
+            <a:endParaRPr lang="en-AU" sz="1050" dirty="0"/>
+          </a:p>
+          <a:p>
+            <a:pPr algn="l"/>
+            <a:endParaRPr lang="en-AU" sz="4000" dirty="0">
+              <a:solidFill>
+                <a:schemeClr val="tx1">
+                  <a:lumMod val="85000"/>
+                </a:schemeClr>
+              </a:solidFill>
+            </a:endParaRPr>
+          </a:p>
+          <a:p>
+            <a:pPr algn="l"/>
+            <a:endParaRPr lang="en-AU" sz="2400" dirty="0"/>
+          </a:p>
+        </p:txBody>
+      </p:sp>
+      <p:graphicFrame>
+        <p:nvGraphicFramePr>
+          <p:cNvPr id="3" name="Table 3">
+            <a:extLst>
+              <a:ext uri="{FF2B5EF4-FFF2-40B4-BE49-F238E27FC236}">
+                <a16:creationId xmlns:a16="http://schemas.microsoft.com/office/drawing/2014/main" id="{CC65CE8E-ECF2-4001-B611-6379EC481E66}"/>
+              </a:ext>
+            </a:extLst>
+          </p:cNvPr>
+          <p:cNvGraphicFramePr>
+            <a:graphicFrameLocks noGrp="1"/>
+          </p:cNvGraphicFramePr>
+          <p:nvPr>
+            <p:extLst>
+              <p:ext uri="{D42A27DB-BD31-4B8C-83A1-F6EECF244321}">
+                <p14:modId xmlns:p14="http://schemas.microsoft.com/office/powerpoint/2010/main" val="2764547873"/>
+              </p:ext>
+            </p:extLst>
+          </p:nvPr>
+        </p:nvGraphicFramePr>
+        <p:xfrm>
+          <a:off x="1544453" y="1601022"/>
+          <a:ext cx="8764954" cy="3452862"/>
+        </p:xfrm>
+        <a:graphic>
+          <a:graphicData uri="http://schemas.openxmlformats.org/drawingml/2006/table">
+            <a:tbl>
+              <a:tblPr firstRow="1" bandRow="1">
+                <a:tableStyleId>{073A0DAA-6AF3-43AB-8588-CEC1D06C72B9}</a:tableStyleId>
+              </a:tblPr>
+              <a:tblGrid>
+                <a:gridCol w="1867388">
+                  <a:extLst>
+                    <a:ext uri="{9D8B030D-6E8A-4147-A177-3AD203B41FA5}">
+                      <a16:colId xmlns:a16="http://schemas.microsoft.com/office/drawing/2014/main" val="223286904"/>
+                    </a:ext>
+                  </a:extLst>
+                </a:gridCol>
+                <a:gridCol w="2479431">
+                  <a:extLst>
+                    <a:ext uri="{9D8B030D-6E8A-4147-A177-3AD203B41FA5}">
+                      <a16:colId xmlns:a16="http://schemas.microsoft.com/office/drawing/2014/main" val="1861262902"/>
+                    </a:ext>
+                  </a:extLst>
+                </a:gridCol>
+                <a:gridCol w="2189285">
+                  <a:extLst>
+                    <a:ext uri="{9D8B030D-6E8A-4147-A177-3AD203B41FA5}">
+                      <a16:colId xmlns:a16="http://schemas.microsoft.com/office/drawing/2014/main" val="3313043178"/>
+                    </a:ext>
+                  </a:extLst>
+                </a:gridCol>
+                <a:gridCol w="2228850">
+                  <a:extLst>
+                    <a:ext uri="{9D8B030D-6E8A-4147-A177-3AD203B41FA5}">
+                      <a16:colId xmlns:a16="http://schemas.microsoft.com/office/drawing/2014/main" val="2122513634"/>
+                    </a:ext>
+                  </a:extLst>
+                </a:gridCol>
+              </a:tblGrid>
+              <a:tr h="168793">
+                <a:tc>
+                  <a:txBody>
+                    <a:bodyPr/>
+                    <a:lstStyle/>
+                    <a:p>
+                      <a:pPr marL="0" marR="0" lvl="0" indent="0" algn="ctr" defTabSz="914400" rtl="0" eaLnBrk="1" fontAlgn="auto" latinLnBrk="0" hangingPunct="1">
+                        <a:lnSpc>
+                          <a:spcPct val="100000"/>
+                        </a:lnSpc>
+                        <a:spcBef>
+                          <a:spcPts val="0"/>
+                        </a:spcBef>
+                        <a:spcAft>
+                          <a:spcPts val="0"/>
+                        </a:spcAft>
+                        <a:buClrTx/>
+                        <a:buSzTx/>
+                        <a:buFontTx/>
+                        <a:buNone/>
+                        <a:tabLst/>
+                        <a:defRPr/>
+                      </a:pPr>
+                      <a:r>
+                        <a:rPr lang="en-AU" sz="1800" dirty="0"/>
+                        <a:t>Classes used</a:t>
+                      </a:r>
+                    </a:p>
+                  </a:txBody>
+                  <a:tcPr anchor="ctr"/>
+                </a:tc>
+                <a:tc>
+                  <a:txBody>
+                    <a:bodyPr/>
+                    <a:lstStyle/>
+                    <a:p>
+                      <a:pPr marL="0" marR="0" lvl="0" indent="0" algn="ctr" defTabSz="914400" rtl="0" eaLnBrk="1" fontAlgn="auto" latinLnBrk="0" hangingPunct="1">
+                        <a:lnSpc>
+                          <a:spcPct val="100000"/>
+                        </a:lnSpc>
+                        <a:spcBef>
+                          <a:spcPts val="0"/>
+                        </a:spcBef>
+                        <a:spcAft>
+                          <a:spcPts val="0"/>
+                        </a:spcAft>
+                        <a:buClrTx/>
+                        <a:buSzTx/>
+                        <a:buFontTx/>
+                        <a:buNone/>
+                        <a:tabLst/>
+                        <a:defRPr/>
+                      </a:pPr>
+                      <a:r>
+                        <a:rPr lang="en-AU" sz="1800" dirty="0"/>
+                        <a:t>School class</a:t>
+                      </a:r>
+                    </a:p>
+                  </a:txBody>
+                  <a:tcPr anchor="ctr"/>
+                </a:tc>
+                <a:tc>
+                  <a:txBody>
+                    <a:bodyPr/>
+                    <a:lstStyle/>
+                    <a:p>
+                      <a:pPr algn="ctr"/>
+                      <a:r>
+                        <a:rPr lang="en-AU" dirty="0"/>
+                        <a:t>Course class</a:t>
+                      </a:r>
+                    </a:p>
+                  </a:txBody>
+                  <a:tcPr/>
+                </a:tc>
+                <a:tc>
+                  <a:txBody>
+                    <a:bodyPr/>
+                    <a:lstStyle/>
+                    <a:p>
+                      <a:pPr algn="ctr"/>
+                      <a:r>
+                        <a:rPr lang="en-AU" dirty="0"/>
+                        <a:t>Student class</a:t>
+                      </a:r>
+                    </a:p>
+                  </a:txBody>
+                  <a:tcPr/>
+                </a:tc>
+                <a:extLst>
+                  <a:ext uri="{0D108BD9-81ED-4DB2-BD59-A6C34878D82A}">
+                    <a16:rowId xmlns:a16="http://schemas.microsoft.com/office/drawing/2014/main" val="2665219014"/>
+                  </a:ext>
+                </a:extLst>
+              </a:tr>
+              <a:tr h="1543551">
+                <a:tc>
+                  <a:txBody>
+                    <a:bodyPr/>
+                    <a:lstStyle/>
+                    <a:p>
+                      <a:pPr marL="0" marR="0" lvl="0" indent="0" algn="ctr" defTabSz="914400" rtl="0" eaLnBrk="1" fontAlgn="auto" latinLnBrk="0" hangingPunct="1">
+                        <a:lnSpc>
+                          <a:spcPct val="100000"/>
+                        </a:lnSpc>
+                        <a:spcBef>
+                          <a:spcPts val="0"/>
+                        </a:spcBef>
+                        <a:spcAft>
+                          <a:spcPts val="0"/>
+                        </a:spcAft>
+                        <a:buClrTx/>
+                        <a:buSzTx/>
+                        <a:buFontTx/>
+                        <a:buNone/>
+                        <a:tabLst/>
+                        <a:defRPr/>
+                      </a:pPr>
+                      <a:r>
+                        <a:rPr lang="en-AU" dirty="0"/>
+                        <a:t>Attributes used</a:t>
+                      </a:r>
+                    </a:p>
+                    <a:p>
+                      <a:pPr algn="ctr"/>
+                      <a:endParaRPr lang="en-AU" dirty="0">
+                        <a:solidFill>
+                          <a:schemeClr val="bg1">
+                            <a:lumMod val="65000"/>
+                            <a:lumOff val="35000"/>
+                          </a:schemeClr>
+                        </a:solidFill>
+                      </a:endParaRPr>
+                    </a:p>
+                  </a:txBody>
+                  <a:tcPr anchor="ctr"/>
+                </a:tc>
+                <a:tc>
+                  <a:txBody>
+                    <a:bodyPr/>
+                    <a:lstStyle/>
+                    <a:p>
+                      <a:pPr algn="ctr"/>
+                      <a:r>
+                        <a:rPr lang="en-AU" dirty="0">
+                          <a:solidFill>
+                            <a:schemeClr val="bg1">
+                              <a:lumMod val="65000"/>
+                              <a:lumOff val="35000"/>
+                            </a:schemeClr>
+                          </a:solidFill>
+                        </a:rPr>
+                        <a:t>Name</a:t>
+                      </a:r>
+                    </a:p>
+                    <a:p>
+                      <a:pPr algn="ctr"/>
+                      <a:r>
+                        <a:rPr lang="en-AU" dirty="0" err="1">
+                          <a:solidFill>
+                            <a:schemeClr val="bg1">
+                              <a:lumMod val="65000"/>
+                              <a:lumOff val="35000"/>
+                            </a:schemeClr>
+                          </a:solidFill>
+                        </a:rPr>
+                        <a:t>Courses_list</a:t>
+                      </a:r>
+                      <a:endParaRPr lang="en-AU" dirty="0">
+                        <a:solidFill>
+                          <a:schemeClr val="bg1">
+                            <a:lumMod val="65000"/>
+                            <a:lumOff val="35000"/>
+                          </a:schemeClr>
+                        </a:solidFill>
+                      </a:endParaRPr>
+                    </a:p>
+                  </a:txBody>
+                  <a:tcPr anchor="ctr"/>
+                </a:tc>
+                <a:tc>
+                  <a:txBody>
+                    <a:bodyPr/>
+                    <a:lstStyle/>
+                    <a:p>
+                      <a:pPr algn="ctr"/>
+                      <a:r>
+                        <a:rPr lang="en-AU" dirty="0">
+                          <a:solidFill>
+                            <a:schemeClr val="bg1">
+                              <a:lumMod val="65000"/>
+                              <a:lumOff val="35000"/>
+                            </a:schemeClr>
+                          </a:solidFill>
+                        </a:rPr>
+                        <a:t>name</a:t>
+                      </a:r>
+                    </a:p>
+                    <a:p>
+                      <a:pPr algn="ctr"/>
+                      <a:r>
+                        <a:rPr lang="en-AU" dirty="0">
+                          <a:solidFill>
+                            <a:schemeClr val="bg1">
+                              <a:lumMod val="65000"/>
+                              <a:lumOff val="35000"/>
+                            </a:schemeClr>
+                          </a:solidFill>
+                        </a:rPr>
+                        <a:t>Duration</a:t>
+                      </a:r>
+                    </a:p>
+                    <a:p>
+                      <a:pPr algn="ctr"/>
+                      <a:r>
+                        <a:rPr lang="en-AU" dirty="0">
+                          <a:solidFill>
+                            <a:schemeClr val="bg1">
+                              <a:lumMod val="65000"/>
+                              <a:lumOff val="35000"/>
+                            </a:schemeClr>
+                          </a:solidFill>
+                        </a:rPr>
+                        <a:t>Price</a:t>
+                      </a:r>
+                    </a:p>
+                    <a:p>
+                      <a:pPr algn="ctr"/>
+                      <a:r>
+                        <a:rPr lang="en-AU" dirty="0" err="1">
+                          <a:solidFill>
+                            <a:schemeClr val="bg1">
+                              <a:lumMod val="65000"/>
+                              <a:lumOff val="35000"/>
+                            </a:schemeClr>
+                          </a:solidFill>
+                        </a:rPr>
+                        <a:t>Syllabus_array</a:t>
+                      </a:r>
+                      <a:endParaRPr lang="en-AU" dirty="0">
+                        <a:solidFill>
+                          <a:schemeClr val="bg1">
+                            <a:lumMod val="65000"/>
+                            <a:lumOff val="35000"/>
+                          </a:schemeClr>
+                        </a:solidFill>
+                      </a:endParaRPr>
+                    </a:p>
+                  </a:txBody>
+                  <a:tcPr anchor="ctr"/>
+                </a:tc>
+                <a:tc>
+                  <a:txBody>
+                    <a:bodyPr/>
+                    <a:lstStyle/>
+                    <a:p>
+                      <a:pPr algn="ctr"/>
+                      <a:r>
+                        <a:rPr lang="en-AU" dirty="0" err="1">
+                          <a:solidFill>
+                            <a:schemeClr val="bg1">
+                              <a:lumMod val="65000"/>
+                              <a:lumOff val="35000"/>
+                            </a:schemeClr>
+                          </a:solidFill>
+                        </a:rPr>
+                        <a:t>first_name</a:t>
+                      </a:r>
+                      <a:endParaRPr lang="en-AU" dirty="0">
+                        <a:solidFill>
+                          <a:schemeClr val="bg1">
+                            <a:lumMod val="65000"/>
+                            <a:lumOff val="35000"/>
+                          </a:schemeClr>
+                        </a:solidFill>
+                      </a:endParaRPr>
+                    </a:p>
+                    <a:p>
+                      <a:pPr algn="ctr"/>
+                      <a:r>
+                        <a:rPr lang="en-AU" dirty="0" err="1">
+                          <a:solidFill>
+                            <a:schemeClr val="bg1">
+                              <a:lumMod val="65000"/>
+                              <a:lumOff val="35000"/>
+                            </a:schemeClr>
+                          </a:solidFill>
+                        </a:rPr>
+                        <a:t>last_name</a:t>
+                      </a:r>
+                      <a:endParaRPr lang="en-AU" dirty="0">
+                        <a:solidFill>
+                          <a:schemeClr val="bg1">
+                            <a:lumMod val="65000"/>
+                            <a:lumOff val="35000"/>
+                          </a:schemeClr>
+                        </a:solidFill>
+                      </a:endParaRPr>
+                    </a:p>
+                    <a:p>
+                      <a:pPr algn="ctr"/>
+                      <a:r>
+                        <a:rPr lang="en-AU" dirty="0" err="1">
+                          <a:solidFill>
+                            <a:schemeClr val="bg1">
+                              <a:lumMod val="65000"/>
+                              <a:lumOff val="35000"/>
+                            </a:schemeClr>
+                          </a:solidFill>
+                        </a:rPr>
+                        <a:t>Enrollments_list</a:t>
+                      </a:r>
+                      <a:endParaRPr lang="en-AU" dirty="0">
+                        <a:solidFill>
+                          <a:schemeClr val="bg1">
+                            <a:lumMod val="65000"/>
+                            <a:lumOff val="35000"/>
+                          </a:schemeClr>
+                        </a:solidFill>
+                      </a:endParaRPr>
+                    </a:p>
+                  </a:txBody>
+                  <a:tcPr anchor="ctr"/>
+                </a:tc>
+                <a:extLst>
+                  <a:ext uri="{0D108BD9-81ED-4DB2-BD59-A6C34878D82A}">
+                    <a16:rowId xmlns:a16="http://schemas.microsoft.com/office/drawing/2014/main" val="3971890215"/>
+                  </a:ext>
+                </a:extLst>
+              </a:tr>
+              <a:tr h="1543551">
+                <a:tc>
+                  <a:txBody>
+                    <a:bodyPr/>
+                    <a:lstStyle/>
+                    <a:p>
+                      <a:pPr algn="ctr"/>
+                      <a:r>
+                        <a:rPr lang="en-AU" dirty="0">
+                          <a:solidFill>
+                            <a:schemeClr val="bg2"/>
+                          </a:solidFill>
+                        </a:rPr>
+                        <a:t>Methods used</a:t>
+                      </a:r>
+                    </a:p>
+                  </a:txBody>
+                  <a:tcPr anchor="ctr"/>
+                </a:tc>
+                <a:tc>
+                  <a:txBody>
+                    <a:bodyPr/>
+                    <a:lstStyle/>
+                    <a:p>
+                      <a:pPr marL="0" marR="0" lvl="0" indent="0" algn="ctr" defTabSz="914400" rtl="0" eaLnBrk="1" fontAlgn="auto" latinLnBrk="0" hangingPunct="1">
+                        <a:lnSpc>
+                          <a:spcPct val="100000"/>
+                        </a:lnSpc>
+                        <a:spcBef>
+                          <a:spcPts val="0"/>
+                        </a:spcBef>
+                        <a:spcAft>
+                          <a:spcPts val="0"/>
+                        </a:spcAft>
+                        <a:buClrTx/>
+                        <a:buSzTx/>
+                        <a:buFontTx/>
+                        <a:buNone/>
+                        <a:tabLst/>
+                        <a:defRPr/>
+                      </a:pPr>
+                      <a:r>
+                        <a:rPr lang="en-AU" sz="1800" b="0" kern="1200" dirty="0" err="1">
+                          <a:solidFill>
+                            <a:schemeClr val="bg1">
+                              <a:lumMod val="65000"/>
+                              <a:lumOff val="35000"/>
+                            </a:schemeClr>
+                          </a:solidFill>
+                          <a:effectLst/>
+                          <a:latin typeface="+mn-lt"/>
+                          <a:ea typeface="+mn-ea"/>
+                          <a:cs typeface="+mn-cs"/>
+                        </a:rPr>
+                        <a:t>print_courses_names</a:t>
+                      </a:r>
+                      <a:endParaRPr lang="en-AU" sz="1800" b="0" kern="1200" dirty="0">
+                        <a:solidFill>
+                          <a:schemeClr val="bg1">
+                            <a:lumMod val="65000"/>
+                            <a:lumOff val="35000"/>
+                          </a:schemeClr>
+                        </a:solidFill>
+                        <a:effectLst/>
+                        <a:latin typeface="+mn-lt"/>
+                        <a:ea typeface="+mn-ea"/>
+                        <a:cs typeface="+mn-cs"/>
+                      </a:endParaRPr>
+                    </a:p>
+                    <a:p>
+                      <a:pPr marL="0" marR="0" lvl="0" indent="0" algn="ctr" defTabSz="914400" rtl="0" eaLnBrk="1" fontAlgn="auto" latinLnBrk="0" hangingPunct="1">
+                        <a:lnSpc>
+                          <a:spcPct val="100000"/>
+                        </a:lnSpc>
+                        <a:spcBef>
+                          <a:spcPts val="0"/>
+                        </a:spcBef>
+                        <a:spcAft>
+                          <a:spcPts val="0"/>
+                        </a:spcAft>
+                        <a:buClrTx/>
+                        <a:buSzTx/>
+                        <a:buFontTx/>
+                        <a:buNone/>
+                        <a:tabLst/>
+                        <a:defRPr/>
+                      </a:pPr>
+                      <a:r>
+                        <a:rPr lang="en-AU" sz="1800" b="0" kern="1200" dirty="0" err="1">
+                          <a:solidFill>
+                            <a:schemeClr val="bg1">
+                              <a:lumMod val="65000"/>
+                              <a:lumOff val="35000"/>
+                            </a:schemeClr>
+                          </a:solidFill>
+                          <a:effectLst/>
+                          <a:latin typeface="+mn-lt"/>
+                          <a:ea typeface="+mn-ea"/>
+                          <a:cs typeface="+mn-cs"/>
+                        </a:rPr>
+                        <a:t>add_course</a:t>
+                      </a:r>
+                      <a:endParaRPr lang="en-AU" sz="1800" b="0" kern="1200" dirty="0">
+                        <a:solidFill>
+                          <a:schemeClr val="bg1">
+                            <a:lumMod val="65000"/>
+                            <a:lumOff val="35000"/>
+                          </a:schemeClr>
+                        </a:solidFill>
+                        <a:effectLst/>
+                        <a:latin typeface="+mn-lt"/>
+                        <a:ea typeface="+mn-ea"/>
+                        <a:cs typeface="+mn-cs"/>
+                      </a:endParaRPr>
+                    </a:p>
+                    <a:p>
+                      <a:pPr marL="0" marR="0" lvl="0" indent="0" algn="ctr" defTabSz="914400" rtl="0" eaLnBrk="1" fontAlgn="auto" latinLnBrk="0" hangingPunct="1">
+                        <a:lnSpc>
+                          <a:spcPct val="100000"/>
+                        </a:lnSpc>
+                        <a:spcBef>
+                          <a:spcPts val="0"/>
+                        </a:spcBef>
+                        <a:spcAft>
+                          <a:spcPts val="0"/>
+                        </a:spcAft>
+                        <a:buClrTx/>
+                        <a:buSzTx/>
+                        <a:buFontTx/>
+                        <a:buNone/>
+                        <a:tabLst/>
+                        <a:defRPr/>
+                      </a:pPr>
+                      <a:r>
+                        <a:rPr lang="en-AU" sz="1800" b="0" kern="1200" dirty="0" err="1">
+                          <a:solidFill>
+                            <a:schemeClr val="bg1">
+                              <a:lumMod val="65000"/>
+                              <a:lumOff val="35000"/>
+                            </a:schemeClr>
+                          </a:solidFill>
+                          <a:effectLst/>
+                          <a:latin typeface="+mn-lt"/>
+                          <a:ea typeface="+mn-ea"/>
+                          <a:cs typeface="+mn-cs"/>
+                        </a:rPr>
+                        <a:t>find_course</a:t>
+                      </a:r>
+                      <a:endParaRPr lang="en-AU" sz="1800" b="0" kern="1200" dirty="0">
+                        <a:solidFill>
+                          <a:schemeClr val="bg1">
+                            <a:lumMod val="65000"/>
+                            <a:lumOff val="35000"/>
+                          </a:schemeClr>
+                        </a:solidFill>
+                        <a:effectLst/>
+                        <a:latin typeface="+mn-lt"/>
+                        <a:ea typeface="+mn-ea"/>
+                        <a:cs typeface="+mn-cs"/>
+                      </a:endParaRPr>
+                    </a:p>
+                    <a:p>
+                      <a:pPr marL="0" marR="0" lvl="0" indent="0" algn="ctr" defTabSz="914400" rtl="0" eaLnBrk="1" fontAlgn="auto" latinLnBrk="0" hangingPunct="1">
+                        <a:lnSpc>
+                          <a:spcPct val="100000"/>
+                        </a:lnSpc>
+                        <a:spcBef>
+                          <a:spcPts val="0"/>
+                        </a:spcBef>
+                        <a:spcAft>
+                          <a:spcPts val="0"/>
+                        </a:spcAft>
+                        <a:buClrTx/>
+                        <a:buSzTx/>
+                        <a:buFontTx/>
+                        <a:buNone/>
+                        <a:tabLst/>
+                        <a:defRPr/>
+                      </a:pPr>
+                      <a:endParaRPr lang="en-AU" sz="1800" b="0" kern="1200" dirty="0">
+                        <a:solidFill>
+                          <a:schemeClr val="bg1">
+                            <a:lumMod val="65000"/>
+                            <a:lumOff val="35000"/>
+                          </a:schemeClr>
+                        </a:solidFill>
+                        <a:effectLst/>
+                        <a:latin typeface="+mn-lt"/>
+                        <a:ea typeface="+mn-ea"/>
+                        <a:cs typeface="+mn-cs"/>
+                      </a:endParaRPr>
+                    </a:p>
+                    <a:p>
+                      <a:pPr algn="ctr"/>
+                      <a:endParaRPr lang="en-AU" dirty="0">
+                        <a:solidFill>
+                          <a:schemeClr val="bg1">
+                            <a:lumMod val="65000"/>
+                            <a:lumOff val="35000"/>
+                          </a:schemeClr>
+                        </a:solidFill>
+                      </a:endParaRPr>
+                    </a:p>
+                  </a:txBody>
+                  <a:tcPr anchor="ctr"/>
+                </a:tc>
+                <a:tc>
+                  <a:txBody>
+                    <a:bodyPr/>
+                    <a:lstStyle/>
+                    <a:p>
+                      <a:pPr marL="0" marR="0" lvl="0" indent="0" algn="ctr" defTabSz="914400" rtl="0" eaLnBrk="1" fontAlgn="auto" latinLnBrk="0" hangingPunct="1">
+                        <a:lnSpc>
+                          <a:spcPct val="100000"/>
+                        </a:lnSpc>
+                        <a:spcBef>
+                          <a:spcPts val="0"/>
+                        </a:spcBef>
+                        <a:spcAft>
+                          <a:spcPts val="0"/>
+                        </a:spcAft>
+                        <a:buClrTx/>
+                        <a:buSzTx/>
+                        <a:buFontTx/>
+                        <a:buNone/>
+                        <a:tabLst/>
+                        <a:defRPr/>
+                      </a:pPr>
+                      <a:r>
+                        <a:rPr lang="en-AU" sz="1800" b="0" kern="1200" dirty="0" err="1">
+                          <a:solidFill>
+                            <a:schemeClr val="bg1">
+                              <a:lumMod val="65000"/>
+                              <a:lumOff val="35000"/>
+                            </a:schemeClr>
+                          </a:solidFill>
+                          <a:effectLst/>
+                          <a:latin typeface="+mn-lt"/>
+                          <a:ea typeface="+mn-ea"/>
+                          <a:cs typeface="+mn-cs"/>
+                        </a:rPr>
+                        <a:t>to_s</a:t>
+                      </a:r>
+                      <a:endParaRPr lang="en-AU" sz="1800" b="0" kern="1200" dirty="0">
+                        <a:solidFill>
+                          <a:schemeClr val="bg1">
+                            <a:lumMod val="65000"/>
+                            <a:lumOff val="35000"/>
+                          </a:schemeClr>
+                        </a:solidFill>
+                        <a:effectLst/>
+                        <a:latin typeface="+mn-lt"/>
+                        <a:ea typeface="+mn-ea"/>
+                        <a:cs typeface="+mn-cs"/>
+                      </a:endParaRPr>
+                    </a:p>
+                    <a:p>
+                      <a:endParaRPr lang="en-AU" dirty="0"/>
+                    </a:p>
+                  </a:txBody>
+                  <a:tcPr anchor="ctr"/>
+                </a:tc>
+                <a:tc>
+                  <a:txBody>
+                    <a:bodyPr/>
+                    <a:lstStyle/>
+                    <a:p>
+                      <a:pPr algn="ctr"/>
+                      <a:r>
+                        <a:rPr lang="en-AU" dirty="0" err="1"/>
+                        <a:t>enrol_course</a:t>
+                      </a:r>
+                      <a:endParaRPr lang="en-AU" dirty="0"/>
+                    </a:p>
+                    <a:p>
+                      <a:pPr algn="ctr"/>
+                      <a:r>
+                        <a:rPr lang="en-AU" dirty="0" err="1"/>
+                        <a:t>unroll_course</a:t>
+                      </a:r>
+                      <a:endParaRPr lang="en-AU" dirty="0"/>
+                    </a:p>
+                    <a:p>
+                      <a:pPr marL="0" marR="0" lvl="0" indent="0" algn="ctr" defTabSz="914400" rtl="0" eaLnBrk="1" fontAlgn="auto" latinLnBrk="0" hangingPunct="1">
+                        <a:lnSpc>
+                          <a:spcPct val="100000"/>
+                        </a:lnSpc>
+                        <a:spcBef>
+                          <a:spcPts val="0"/>
+                        </a:spcBef>
+                        <a:spcAft>
+                          <a:spcPts val="0"/>
+                        </a:spcAft>
+                        <a:buClrTx/>
+                        <a:buSzTx/>
+                        <a:buFontTx/>
+                        <a:buNone/>
+                        <a:tabLst/>
+                        <a:defRPr/>
+                      </a:pPr>
+                      <a:r>
+                        <a:rPr lang="en-AU" sz="1800" b="0" kern="1200" dirty="0" err="1">
+                          <a:solidFill>
+                            <a:schemeClr val="dk1"/>
+                          </a:solidFill>
+                          <a:effectLst/>
+                          <a:latin typeface="+mn-lt"/>
+                          <a:ea typeface="+mn-ea"/>
+                          <a:cs typeface="+mn-cs"/>
+                        </a:rPr>
+                        <a:t>show_enrollments</a:t>
+                      </a:r>
+                      <a:endParaRPr lang="en-AU" sz="1800" b="0" kern="1200" dirty="0">
+                        <a:solidFill>
+                          <a:schemeClr val="dk1"/>
+                        </a:solidFill>
+                        <a:effectLst/>
+                        <a:latin typeface="+mn-lt"/>
+                        <a:ea typeface="+mn-ea"/>
+                        <a:cs typeface="+mn-cs"/>
+                      </a:endParaRPr>
+                    </a:p>
+                    <a:p>
+                      <a:endParaRPr lang="en-AU" dirty="0"/>
+                    </a:p>
+                  </a:txBody>
+                  <a:tcPr anchor="ctr"/>
+                </a:tc>
+                <a:extLst>
+                  <a:ext uri="{0D108BD9-81ED-4DB2-BD59-A6C34878D82A}">
+                    <a16:rowId xmlns:a16="http://schemas.microsoft.com/office/drawing/2014/main" val="206111668"/>
+                  </a:ext>
+                </a:extLst>
+              </a:tr>
+            </a:tbl>
+          </a:graphicData>
+        </a:graphic>
+      </p:graphicFrame>
+    </p:spTree>
+    <p:extLst>
+      <p:ext uri="{BB962C8B-B14F-4D97-AF65-F5344CB8AC3E}">
+        <p14:creationId xmlns:p14="http://schemas.microsoft.com/office/powerpoint/2010/main" val="600531520"/>
+      </p:ext>
+    </p:extLst>
+  </p:cSld>
+  <p:clrMapOvr>
+    <a:masterClrMapping/>
+  </p:clrMapOvr>
+</p:sld>
+</file>
+
+<file path=ppt/slides/slide5.xml><?xml version="1.0" encoding="utf-8"?>
 <p:sld xmlns:a="http://schemas.openxmlformats.org/drawingml/2006/main" xmlns:r="http://schemas.openxmlformats.org/officeDocument/2006/relationships" xmlns:p="http://schemas.openxmlformats.org/presentationml/2006/main">
   <p:cSld>
     <p:spTree>
@@ -5019,8 +6061,8 @@
         </p:blipFill>
         <p:spPr>
           <a:xfrm>
-            <a:off x="246567" y="998620"/>
-            <a:ext cx="11698864" cy="2027386"/>
+            <a:off x="1011498" y="1090939"/>
+            <a:ext cx="10312995" cy="1787218"/>
           </a:xfrm>
           <a:prstGeom prst="rect">
             <a:avLst/>
@@ -5049,7 +6091,7 @@
         </p:blipFill>
         <p:spPr>
           <a:xfrm>
-            <a:off x="4323134" y="3324533"/>
+            <a:off x="4323134" y="3575114"/>
             <a:ext cx="3545731" cy="2108433"/>
           </a:xfrm>
           <a:prstGeom prst="rect">
@@ -5112,7 +6154,7 @@
 </p:sld>
 </file>
 
-<file path=ppt/slides/slide5.xml><?xml version="1.0" encoding="utf-8"?>
+<file path=ppt/slides/slide6.xml><?xml version="1.0" encoding="utf-8"?>
 <p:sld xmlns:a="http://schemas.openxmlformats.org/drawingml/2006/main" xmlns:r="http://schemas.openxmlformats.org/officeDocument/2006/relationships" xmlns:p="http://schemas.openxmlformats.org/presentationml/2006/main">
   <p:cSld>
     <p:spTree>
@@ -5188,6 +6230,68 @@
           </a:prstGeom>
         </p:spPr>
       </p:pic>
+      <p:sp>
+        <p:nvSpPr>
+          <p:cNvPr id="6" name="TextBox 5">
+            <a:extLst>
+              <a:ext uri="{FF2B5EF4-FFF2-40B4-BE49-F238E27FC236}">
+                <a16:creationId xmlns:a16="http://schemas.microsoft.com/office/drawing/2014/main" id="{1798C9EE-EC81-49E5-B068-756F042C38D9}"/>
+              </a:ext>
+            </a:extLst>
+          </p:cNvPr>
+          <p:cNvSpPr txBox="1"/>
+          <p:nvPr/>
+        </p:nvSpPr>
+        <p:spPr>
+          <a:xfrm>
+            <a:off x="1017369" y="971523"/>
+            <a:ext cx="6096784" cy="461665"/>
+          </a:xfrm>
+          <a:prstGeom prst="rect">
+            <a:avLst/>
+          </a:prstGeom>
+          <a:noFill/>
+        </p:spPr>
+        <p:txBody>
+          <a:bodyPr wrap="square">
+            <a:spAutoFit/>
+          </a:bodyPr>
+          <a:lstStyle/>
+          <a:p>
+            <a:pPr algn="l"/>
+            <a:r>
+              <a:rPr lang="en-AU" sz="2400" dirty="0">
+                <a:solidFill>
+                  <a:schemeClr val="tx1">
+                    <a:lumMod val="75000"/>
+                  </a:schemeClr>
+                </a:solidFill>
+              </a:rPr>
+              <a:t>Using </a:t>
+            </a:r>
+            <a:r>
+              <a:rPr lang="en-AU" sz="2400" dirty="0" err="1">
+                <a:solidFill>
+                  <a:schemeClr val="tx1">
+                    <a:lumMod val="75000"/>
+                  </a:schemeClr>
+                </a:solidFill>
+              </a:rPr>
+              <a:t>parse_argv</a:t>
+            </a:r>
+            <a:r>
+              <a:rPr lang="en-AU" sz="2400" dirty="0">
+                <a:solidFill>
+                  <a:schemeClr val="tx1">
+                    <a:lumMod val="75000"/>
+                  </a:schemeClr>
+                </a:solidFill>
+              </a:rPr>
+              <a:t> function</a:t>
+            </a:r>
+          </a:p>
+        </p:txBody>
+      </p:sp>
     </p:spTree>
     <p:extLst>
       <p:ext uri="{BB962C8B-B14F-4D97-AF65-F5344CB8AC3E}">
@@ -5201,7 +6305,7 @@
 </p:sld>
 </file>
 
-<file path=ppt/slides/slide6.xml><?xml version="1.0" encoding="utf-8"?>
+<file path=ppt/slides/slide7.xml><?xml version="1.0" encoding="utf-8"?>
 <p:sld xmlns:a="http://schemas.openxmlformats.org/drawingml/2006/main" xmlns:r="http://schemas.openxmlformats.org/officeDocument/2006/relationships" xmlns:p="http://schemas.openxmlformats.org/presentationml/2006/main">
   <p:cSld>
     <p:spTree>
@@ -5240,7 +6344,7 @@
         </p:blipFill>
         <p:spPr>
           <a:xfrm>
-            <a:off x="1027522" y="1428662"/>
+            <a:off x="1018730" y="558223"/>
             <a:ext cx="10355344" cy="3414012"/>
           </a:xfrm>
           <a:prstGeom prst="rect">
@@ -5248,6 +6352,82 @@
           </a:prstGeom>
         </p:spPr>
       </p:pic>
+      <p:pic>
+        <p:nvPicPr>
+          <p:cNvPr id="5" name="Picture 4">
+            <a:extLst>
+              <a:ext uri="{FF2B5EF4-FFF2-40B4-BE49-F238E27FC236}">
+                <a16:creationId xmlns:a16="http://schemas.microsoft.com/office/drawing/2014/main" id="{B392071D-8C8D-48E9-BE59-68F3D33F9115}"/>
+              </a:ext>
+            </a:extLst>
+          </p:cNvPr>
+          <p:cNvPicPr>
+            <a:picLocks noChangeAspect="1"/>
+          </p:cNvPicPr>
+          <p:nvPr/>
+        </p:nvPicPr>
+        <p:blipFill>
+          <a:blip r:embed="rId3"/>
+          <a:stretch>
+            <a:fillRect/>
+          </a:stretch>
+        </p:blipFill>
+        <p:spPr>
+          <a:xfrm>
+            <a:off x="1180707" y="4931264"/>
+            <a:ext cx="9830586" cy="1190864"/>
+          </a:xfrm>
+          <a:prstGeom prst="rect">
+            <a:avLst/>
+          </a:prstGeom>
+        </p:spPr>
+      </p:pic>
+      <p:sp>
+        <p:nvSpPr>
+          <p:cNvPr id="6" name="Arrow: Down 5">
+            <a:extLst>
+              <a:ext uri="{FF2B5EF4-FFF2-40B4-BE49-F238E27FC236}">
+                <a16:creationId xmlns:a16="http://schemas.microsoft.com/office/drawing/2014/main" id="{98FE792D-834D-4DCD-B22B-82DB53FCA2A6}"/>
+              </a:ext>
+            </a:extLst>
+          </p:cNvPr>
+          <p:cNvSpPr/>
+          <p:nvPr/>
+        </p:nvSpPr>
+        <p:spPr>
+          <a:xfrm>
+            <a:off x="5462833" y="3864990"/>
+            <a:ext cx="400639" cy="1066274"/>
+          </a:xfrm>
+          <a:prstGeom prst="downArrow">
+            <a:avLst/>
+          </a:prstGeom>
+        </p:spPr>
+        <p:style>
+          <a:lnRef idx="2">
+            <a:schemeClr val="accent1">
+              <a:shade val="50000"/>
+            </a:schemeClr>
+          </a:lnRef>
+          <a:fillRef idx="1">
+            <a:schemeClr val="accent1"/>
+          </a:fillRef>
+          <a:effectRef idx="0">
+            <a:schemeClr val="accent1"/>
+          </a:effectRef>
+          <a:fontRef idx="minor">
+            <a:schemeClr val="lt1"/>
+          </a:fontRef>
+        </p:style>
+        <p:txBody>
+          <a:bodyPr rtlCol="0" anchor="ctr"/>
+          <a:lstStyle/>
+          <a:p>
+            <a:pPr algn="ctr"/>
+            <a:endParaRPr lang="en-AU"/>
+          </a:p>
+        </p:txBody>
+      </p:sp>
     </p:spTree>
     <p:extLst>
       <p:ext uri="{BB962C8B-B14F-4D97-AF65-F5344CB8AC3E}">
@@ -5261,7 +6441,143 @@
 </p:sld>
 </file>
 
-<file path=ppt/slides/slide7.xml><?xml version="1.0" encoding="utf-8"?>
+<file path=ppt/slides/slide8.xml><?xml version="1.0" encoding="utf-8"?>
+<p:sld xmlns:a="http://schemas.openxmlformats.org/drawingml/2006/main" xmlns:r="http://schemas.openxmlformats.org/officeDocument/2006/relationships" xmlns:p="http://schemas.openxmlformats.org/presentationml/2006/main">
+  <p:cSld>
+    <p:spTree>
+      <p:nvGrpSpPr>
+        <p:cNvPr id="1" name=""/>
+        <p:cNvGrpSpPr/>
+        <p:nvPr/>
+      </p:nvGrpSpPr>
+      <p:grpSpPr>
+        <a:xfrm>
+          <a:off x="0" y="0"/>
+          <a:ext cx="0" cy="0"/>
+          <a:chOff x="0" y="0"/>
+          <a:chExt cx="0" cy="0"/>
+        </a:xfrm>
+      </p:grpSpPr>
+      <p:pic>
+        <p:nvPicPr>
+          <p:cNvPr id="3" name="Picture 2">
+            <a:extLst>
+              <a:ext uri="{FF2B5EF4-FFF2-40B4-BE49-F238E27FC236}">
+                <a16:creationId xmlns:a16="http://schemas.microsoft.com/office/drawing/2014/main" id="{19A5BC44-69A5-4E2D-89C9-34F65A36FAA4}"/>
+              </a:ext>
+            </a:extLst>
+          </p:cNvPr>
+          <p:cNvPicPr>
+            <a:picLocks noChangeAspect="1"/>
+          </p:cNvPicPr>
+          <p:nvPr/>
+        </p:nvPicPr>
+        <p:blipFill>
+          <a:blip r:embed="rId2"/>
+          <a:stretch>
+            <a:fillRect/>
+          </a:stretch>
+        </p:blipFill>
+        <p:spPr>
+          <a:xfrm>
+            <a:off x="997052" y="517259"/>
+            <a:ext cx="10340240" cy="2612441"/>
+          </a:xfrm>
+          <a:prstGeom prst="rect">
+            <a:avLst/>
+          </a:prstGeom>
+        </p:spPr>
+      </p:pic>
+      <p:sp>
+        <p:nvSpPr>
+          <p:cNvPr id="4" name="Arrow: Down 3">
+            <a:extLst>
+              <a:ext uri="{FF2B5EF4-FFF2-40B4-BE49-F238E27FC236}">
+                <a16:creationId xmlns:a16="http://schemas.microsoft.com/office/drawing/2014/main" id="{2A0A7EF1-5D77-4EA3-A4F3-AC4BA8340E28}"/>
+              </a:ext>
+            </a:extLst>
+          </p:cNvPr>
+          <p:cNvSpPr/>
+          <p:nvPr/>
+        </p:nvSpPr>
+        <p:spPr>
+          <a:xfrm>
+            <a:off x="5462833" y="3129700"/>
+            <a:ext cx="400639" cy="1066274"/>
+          </a:xfrm>
+          <a:prstGeom prst="downArrow">
+            <a:avLst/>
+          </a:prstGeom>
+        </p:spPr>
+        <p:style>
+          <a:lnRef idx="2">
+            <a:schemeClr val="accent1">
+              <a:shade val="50000"/>
+            </a:schemeClr>
+          </a:lnRef>
+          <a:fillRef idx="1">
+            <a:schemeClr val="accent1"/>
+          </a:fillRef>
+          <a:effectRef idx="0">
+            <a:schemeClr val="accent1"/>
+          </a:effectRef>
+          <a:fontRef idx="minor">
+            <a:schemeClr val="lt1"/>
+          </a:fontRef>
+        </p:style>
+        <p:txBody>
+          <a:bodyPr rtlCol="0" anchor="ctr"/>
+          <a:lstStyle/>
+          <a:p>
+            <a:pPr algn="ctr"/>
+            <a:endParaRPr lang="en-AU"/>
+          </a:p>
+        </p:txBody>
+      </p:sp>
+      <p:pic>
+        <p:nvPicPr>
+          <p:cNvPr id="6" name="Picture 5">
+            <a:extLst>
+              <a:ext uri="{FF2B5EF4-FFF2-40B4-BE49-F238E27FC236}">
+                <a16:creationId xmlns:a16="http://schemas.microsoft.com/office/drawing/2014/main" id="{5A70E650-5052-420B-9982-6242388A04C6}"/>
+              </a:ext>
+            </a:extLst>
+          </p:cNvPr>
+          <p:cNvPicPr>
+            <a:picLocks noChangeAspect="1"/>
+          </p:cNvPicPr>
+          <p:nvPr/>
+        </p:nvPicPr>
+        <p:blipFill>
+          <a:blip r:embed="rId3"/>
+          <a:stretch>
+            <a:fillRect/>
+          </a:stretch>
+        </p:blipFill>
+        <p:spPr>
+          <a:xfrm>
+            <a:off x="1767524" y="4195974"/>
+            <a:ext cx="8336437" cy="1365273"/>
+          </a:xfrm>
+          <a:prstGeom prst="rect">
+            <a:avLst/>
+          </a:prstGeom>
+        </p:spPr>
+      </p:pic>
+    </p:spTree>
+    <p:extLst>
+      <p:ext uri="{BB962C8B-B14F-4D97-AF65-F5344CB8AC3E}">
+        <p14:creationId xmlns:p14="http://schemas.microsoft.com/office/powerpoint/2010/main" val="2431234747"/>
+      </p:ext>
+    </p:extLst>
+  </p:cSld>
+  <p:clrMapOvr>
+    <a:masterClrMapping/>
+  </p:clrMapOvr>
+</p:sld>
+</file>
+
+<file path=ppt/slides/slide9.xml><?xml version="1.0" encoding="utf-8"?>
 <p:sld xmlns:a="http://schemas.openxmlformats.org/drawingml/2006/main" xmlns:r="http://schemas.openxmlformats.org/officeDocument/2006/relationships" xmlns:p="http://schemas.openxmlformats.org/presentationml/2006/main">
   <p:cSld>
     <p:spTree>
@@ -5300,48 +6616,60 @@
         </p:blipFill>
         <p:spPr>
           <a:xfrm>
-            <a:off x="156079" y="0"/>
+            <a:off x="104232" y="0"/>
             <a:ext cx="11879842" cy="6858000"/>
           </a:xfrm>
           <a:prstGeom prst="rect">
             <a:avLst/>
           </a:prstGeom>
+        </p:spPr>
+      </p:pic>
+      <p:pic>
+        <p:nvPicPr>
+          <p:cNvPr id="5" name="Picture 4">
+            <a:extLst>
+              <a:ext uri="{FF2B5EF4-FFF2-40B4-BE49-F238E27FC236}">
+                <a16:creationId xmlns:a16="http://schemas.microsoft.com/office/drawing/2014/main" id="{039374CB-20CA-4899-A291-95EFBBFD29FA}"/>
+              </a:ext>
+            </a:extLst>
+          </p:cNvPr>
+          <p:cNvPicPr>
+            <a:picLocks noChangeAspect="1"/>
+          </p:cNvPicPr>
+          <p:nvPr/>
+        </p:nvPicPr>
+        <p:blipFill>
+          <a:blip r:embed="rId3"/>
+          <a:stretch>
+            <a:fillRect/>
+          </a:stretch>
+        </p:blipFill>
+        <p:spPr>
+          <a:xfrm>
+            <a:off x="5788058" y="4580719"/>
+            <a:ext cx="5656990" cy="1165767"/>
+          </a:xfrm>
+          <a:prstGeom prst="rect">
+            <a:avLst/>
+          </a:prstGeom>
+          <a:ln w="228600" cap="sq" cmpd="thickThin">
+            <a:solidFill>
+              <a:srgbClr val="000000"/>
+            </a:solidFill>
+            <a:prstDash val="solid"/>
+            <a:miter lim="800000"/>
+          </a:ln>
+          <a:effectLst>
+            <a:innerShdw blurRad="76200">
+              <a:srgbClr val="000000"/>
+            </a:innerShdw>
+          </a:effectLst>
         </p:spPr>
       </p:pic>
     </p:spTree>
     <p:extLst>
       <p:ext uri="{BB962C8B-B14F-4D97-AF65-F5344CB8AC3E}">
         <p14:creationId xmlns:p14="http://schemas.microsoft.com/office/powerpoint/2010/main" val="951059157"/>
-      </p:ext>
-    </p:extLst>
-  </p:cSld>
-  <p:clrMapOvr>
-    <a:masterClrMapping/>
-  </p:clrMapOvr>
-</p:sld>
-</file>
-
-<file path=ppt/slides/slide8.xml><?xml version="1.0" encoding="utf-8"?>
-<p:sld xmlns:a="http://schemas.openxmlformats.org/drawingml/2006/main" xmlns:r="http://schemas.openxmlformats.org/officeDocument/2006/relationships" xmlns:p="http://schemas.openxmlformats.org/presentationml/2006/main">
-  <p:cSld>
-    <p:spTree>
-      <p:nvGrpSpPr>
-        <p:cNvPr id="1" name=""/>
-        <p:cNvGrpSpPr/>
-        <p:nvPr/>
-      </p:nvGrpSpPr>
-      <p:grpSpPr>
-        <a:xfrm>
-          <a:off x="0" y="0"/>
-          <a:ext cx="0" cy="0"/>
-          <a:chOff x="0" y="0"/>
-          <a:chExt cx="0" cy="0"/>
-        </a:xfrm>
-      </p:grpSpPr>
-    </p:spTree>
-    <p:extLst>
-      <p:ext uri="{BB962C8B-B14F-4D97-AF65-F5344CB8AC3E}">
-        <p14:creationId xmlns:p14="http://schemas.microsoft.com/office/powerpoint/2010/main" val="1253942707"/>
       </p:ext>
     </p:extLst>
   </p:cSld>

</xml_diff>